<commit_message>
feat: rm node modules and small changes in slides and README
</commit_message>
<xml_diff>
--- a/CSP-Wordle-Solver/slides/Slides - CSP Wordle Solver.pptx
+++ b/CSP-Wordle-Solver/slides/Slides - CSP Wordle Solver.pptx
@@ -844,7 +844,7 @@
   <p:cSld>
     <p:spTree>
       <p:nvGrpSpPr>
-        <p:cNvPr id="144" name="Shape 144"/>
+        <p:cNvPr id="146" name="Shape 146"/>
         <p:cNvGrpSpPr/>
         <p:nvPr/>
       </p:nvGrpSpPr>
@@ -858,7 +858,7 @@
       </p:grpSpPr>
       <p:sp>
         <p:nvSpPr>
-          <p:cNvPr id="145" name="Google Shape;145;g3495efbc633_0_17:notes"/>
+          <p:cNvPr id="147" name="Google Shape;147;g3495efbc633_0_17:notes"/>
           <p:cNvSpPr/>
           <p:nvPr>
             <p:ph idx="2" type="sldImg"/>
@@ -893,7 +893,7 @@
       </p:sp>
       <p:sp>
         <p:nvSpPr>
-          <p:cNvPr id="146" name="Google Shape;146;g3495efbc633_0_17:notes"/>
+          <p:cNvPr id="148" name="Google Shape;148;g3495efbc633_0_17:notes"/>
           <p:cNvSpPr txBox="1"/>
           <p:nvPr>
             <p:ph idx="1" type="body"/>
@@ -943,7 +943,7 @@
   <p:cSld>
     <p:spTree>
       <p:nvGrpSpPr>
-        <p:cNvPr id="151" name="Shape 151"/>
+        <p:cNvPr id="153" name="Shape 153"/>
         <p:cNvGrpSpPr/>
         <p:nvPr/>
       </p:nvGrpSpPr>
@@ -957,7 +957,7 @@
       </p:grpSpPr>
       <p:sp>
         <p:nvSpPr>
-          <p:cNvPr id="152" name="Google Shape;152;g3495efbc633_0_12:notes"/>
+          <p:cNvPr id="154" name="Google Shape;154;g3495efbc633_0_12:notes"/>
           <p:cNvSpPr/>
           <p:nvPr>
             <p:ph idx="2" type="sldImg"/>
@@ -992,7 +992,7 @@
       </p:sp>
       <p:sp>
         <p:nvSpPr>
-          <p:cNvPr id="153" name="Google Shape;153;g3495efbc633_0_12:notes"/>
+          <p:cNvPr id="155" name="Google Shape;155;g3495efbc633_0_12:notes"/>
           <p:cNvSpPr txBox="1"/>
           <p:nvPr>
             <p:ph idx="1" type="body"/>
@@ -1042,7 +1042,7 @@
   <p:cSld>
     <p:spTree>
       <p:nvGrpSpPr>
-        <p:cNvPr id="157" name="Shape 157"/>
+        <p:cNvPr id="159" name="Shape 159"/>
         <p:cNvGrpSpPr/>
         <p:nvPr/>
       </p:nvGrpSpPr>
@@ -1056,7 +1056,7 @@
       </p:grpSpPr>
       <p:sp>
         <p:nvSpPr>
-          <p:cNvPr id="158" name="Google Shape;158;g349766a4ac5_0_1:notes"/>
+          <p:cNvPr id="160" name="Google Shape;160;g349766a4ac5_0_1:notes"/>
           <p:cNvSpPr/>
           <p:nvPr>
             <p:ph idx="2" type="sldImg"/>
@@ -1091,7 +1091,7 @@
       </p:sp>
       <p:sp>
         <p:nvSpPr>
-          <p:cNvPr id="159" name="Google Shape;159;g349766a4ac5_0_1:notes"/>
+          <p:cNvPr id="161" name="Google Shape;161;g349766a4ac5_0_1:notes"/>
           <p:cNvSpPr txBox="1"/>
           <p:nvPr>
             <p:ph idx="1" type="body"/>
@@ -1141,7 +1141,7 @@
   <p:cSld>
     <p:spTree>
       <p:nvGrpSpPr>
-        <p:cNvPr id="182" name="Shape 182"/>
+        <p:cNvPr id="184" name="Shape 184"/>
         <p:cNvGrpSpPr/>
         <p:nvPr/>
       </p:nvGrpSpPr>
@@ -1155,7 +1155,7 @@
       </p:grpSpPr>
       <p:sp>
         <p:nvSpPr>
-          <p:cNvPr id="183" name="Google Shape;183;g349766a4ac5_0_767:notes"/>
+          <p:cNvPr id="185" name="Google Shape;185;g349766a4ac5_0_767:notes"/>
           <p:cNvSpPr/>
           <p:nvPr>
             <p:ph idx="2" type="sldImg"/>
@@ -1190,7 +1190,7 @@
       </p:sp>
       <p:sp>
         <p:nvSpPr>
-          <p:cNvPr id="184" name="Google Shape;184;g349766a4ac5_0_767:notes"/>
+          <p:cNvPr id="186" name="Google Shape;186;g349766a4ac5_0_767:notes"/>
           <p:cNvSpPr txBox="1"/>
           <p:nvPr>
             <p:ph idx="1" type="body"/>
@@ -1240,7 +1240,7 @@
   <p:cSld>
     <p:spTree>
       <p:nvGrpSpPr>
-        <p:cNvPr id="221" name="Shape 221"/>
+        <p:cNvPr id="223" name="Shape 223"/>
         <p:cNvGrpSpPr/>
         <p:nvPr/>
       </p:nvGrpSpPr>
@@ -1254,7 +1254,7 @@
       </p:grpSpPr>
       <p:sp>
         <p:nvSpPr>
-          <p:cNvPr id="222" name="Google Shape;222;g34945f83840_0_5:notes"/>
+          <p:cNvPr id="224" name="Google Shape;224;g34945f83840_0_5:notes"/>
           <p:cNvSpPr/>
           <p:nvPr>
             <p:ph idx="2" type="sldImg"/>
@@ -1289,7 +1289,7 @@
       </p:sp>
       <p:sp>
         <p:nvSpPr>
-          <p:cNvPr id="223" name="Google Shape;223;g34945f83840_0_5:notes"/>
+          <p:cNvPr id="225" name="Google Shape;225;g34945f83840_0_5:notes"/>
           <p:cNvSpPr txBox="1"/>
           <p:nvPr>
             <p:ph idx="1" type="body"/>
@@ -1339,7 +1339,7 @@
   <p:cSld>
     <p:spTree>
       <p:nvGrpSpPr>
-        <p:cNvPr id="230" name="Shape 230"/>
+        <p:cNvPr id="232" name="Shape 232"/>
         <p:cNvGrpSpPr/>
         <p:nvPr/>
       </p:nvGrpSpPr>
@@ -1353,7 +1353,7 @@
       </p:grpSpPr>
       <p:sp>
         <p:nvSpPr>
-          <p:cNvPr id="231" name="Google Shape;231;g3487e82bb04_0_44:notes"/>
+          <p:cNvPr id="233" name="Google Shape;233;g3487e82bb04_0_44:notes"/>
           <p:cNvSpPr/>
           <p:nvPr>
             <p:ph idx="2" type="sldImg"/>
@@ -1388,7 +1388,7 @@
       </p:sp>
       <p:sp>
         <p:nvSpPr>
-          <p:cNvPr id="232" name="Google Shape;232;g3487e82bb04_0_44:notes"/>
+          <p:cNvPr id="234" name="Google Shape;234;g3487e82bb04_0_44:notes"/>
           <p:cNvSpPr txBox="1"/>
           <p:nvPr>
             <p:ph idx="1" type="body"/>
@@ -1438,7 +1438,7 @@
   <p:cSld>
     <p:spTree>
       <p:nvGrpSpPr>
-        <p:cNvPr id="236" name="Shape 236"/>
+        <p:cNvPr id="238" name="Shape 238"/>
         <p:cNvGrpSpPr/>
         <p:nvPr/>
       </p:nvGrpSpPr>
@@ -1452,7 +1452,7 @@
       </p:grpSpPr>
       <p:sp>
         <p:nvSpPr>
-          <p:cNvPr id="237" name="Google Shape;237;g3495efbc633_0_0:notes"/>
+          <p:cNvPr id="239" name="Google Shape;239;g3495efbc633_0_0:notes"/>
           <p:cNvSpPr/>
           <p:nvPr>
             <p:ph idx="2" type="sldImg"/>
@@ -1487,7 +1487,7 @@
       </p:sp>
       <p:sp>
         <p:nvSpPr>
-          <p:cNvPr id="238" name="Google Shape;238;g3495efbc633_0_0:notes"/>
+          <p:cNvPr id="240" name="Google Shape;240;g3495efbc633_0_0:notes"/>
           <p:cNvSpPr txBox="1"/>
           <p:nvPr>
             <p:ph idx="1" type="body"/>
@@ -1537,7 +1537,7 @@
   <p:cSld>
     <p:spTree>
       <p:nvGrpSpPr>
-        <p:cNvPr id="244" name="Shape 244"/>
+        <p:cNvPr id="246" name="Shape 246"/>
         <p:cNvGrpSpPr/>
         <p:nvPr/>
       </p:nvGrpSpPr>
@@ -1551,7 +1551,7 @@
       </p:grpSpPr>
       <p:sp>
         <p:nvSpPr>
-          <p:cNvPr id="245" name="Google Shape;245;g3487e82bb04_0_48:notes"/>
+          <p:cNvPr id="247" name="Google Shape;247;g3487e82bb04_0_48:notes"/>
           <p:cNvSpPr/>
           <p:nvPr>
             <p:ph idx="2" type="sldImg"/>
@@ -1586,7 +1586,7 @@
       </p:sp>
       <p:sp>
         <p:nvSpPr>
-          <p:cNvPr id="246" name="Google Shape;246;g3487e82bb04_0_48:notes"/>
+          <p:cNvPr id="248" name="Google Shape;248;g3487e82bb04_0_48:notes"/>
           <p:cNvSpPr txBox="1"/>
           <p:nvPr>
             <p:ph idx="1" type="body"/>
@@ -1636,7 +1636,7 @@
   <p:cSld>
     <p:spTree>
       <p:nvGrpSpPr>
-        <p:cNvPr id="250" name="Shape 250"/>
+        <p:cNvPr id="252" name="Shape 252"/>
         <p:cNvGrpSpPr/>
         <p:nvPr/>
       </p:nvGrpSpPr>
@@ -1650,7 +1650,7 @@
       </p:grpSpPr>
       <p:sp>
         <p:nvSpPr>
-          <p:cNvPr id="251" name="Google Shape;251;g3487e82bb04_0_53:notes"/>
+          <p:cNvPr id="253" name="Google Shape;253;g3487e82bb04_0_53:notes"/>
           <p:cNvSpPr/>
           <p:nvPr>
             <p:ph idx="2" type="sldImg"/>
@@ -1685,7 +1685,7 @@
       </p:sp>
       <p:sp>
         <p:nvSpPr>
-          <p:cNvPr id="252" name="Google Shape;252;g3487e82bb04_0_53:notes"/>
+          <p:cNvPr id="254" name="Google Shape;254;g3487e82bb04_0_53:notes"/>
           <p:cNvSpPr txBox="1"/>
           <p:nvPr>
             <p:ph idx="1" type="body"/>
@@ -2230,7 +2230,7 @@
   <p:cSld>
     <p:spTree>
       <p:nvGrpSpPr>
-        <p:cNvPr id="93" name="Shape 93"/>
+        <p:cNvPr id="95" name="Shape 95"/>
         <p:cNvGrpSpPr/>
         <p:nvPr/>
       </p:nvGrpSpPr>
@@ -2244,7 +2244,7 @@
       </p:grpSpPr>
       <p:sp>
         <p:nvSpPr>
-          <p:cNvPr id="94" name="Google Shape;94;g3487e82bb04_0_27:notes"/>
+          <p:cNvPr id="96" name="Google Shape;96;g3487e82bb04_0_27:notes"/>
           <p:cNvSpPr/>
           <p:nvPr>
             <p:ph idx="2" type="sldImg"/>
@@ -2279,7 +2279,7 @@
       </p:sp>
       <p:sp>
         <p:nvSpPr>
-          <p:cNvPr id="95" name="Google Shape;95;g3487e82bb04_0_27:notes"/>
+          <p:cNvPr id="97" name="Google Shape;97;g3487e82bb04_0_27:notes"/>
           <p:cNvSpPr txBox="1"/>
           <p:nvPr>
             <p:ph idx="1" type="body"/>
@@ -2329,7 +2329,7 @@
   <p:cSld>
     <p:spTree>
       <p:nvGrpSpPr>
-        <p:cNvPr id="99" name="Shape 99"/>
+        <p:cNvPr id="101" name="Shape 101"/>
         <p:cNvGrpSpPr/>
         <p:nvPr/>
       </p:nvGrpSpPr>
@@ -2343,7 +2343,7 @@
       </p:grpSpPr>
       <p:sp>
         <p:nvSpPr>
-          <p:cNvPr id="100" name="Google Shape;100;g34923425378_0_62:notes"/>
+          <p:cNvPr id="102" name="Google Shape;102;g34923425378_0_62:notes"/>
           <p:cNvSpPr/>
           <p:nvPr>
             <p:ph idx="2" type="sldImg"/>
@@ -2378,7 +2378,7 @@
       </p:sp>
       <p:sp>
         <p:nvSpPr>
-          <p:cNvPr id="101" name="Google Shape;101;g34923425378_0_62:notes"/>
+          <p:cNvPr id="103" name="Google Shape;103;g34923425378_0_62:notes"/>
           <p:cNvSpPr txBox="1"/>
           <p:nvPr>
             <p:ph idx="1" type="body"/>
@@ -2428,7 +2428,7 @@
   <p:cSld>
     <p:spTree>
       <p:nvGrpSpPr>
-        <p:cNvPr id="131" name="Shape 131"/>
+        <p:cNvPr id="133" name="Shape 133"/>
         <p:cNvGrpSpPr/>
         <p:nvPr/>
       </p:nvGrpSpPr>
@@ -2442,7 +2442,7 @@
       </p:grpSpPr>
       <p:sp>
         <p:nvSpPr>
-          <p:cNvPr id="132" name="Google Shape;132;g349490f2b00_0_0:notes"/>
+          <p:cNvPr id="134" name="Google Shape;134;g349490f2b00_0_0:notes"/>
           <p:cNvSpPr/>
           <p:nvPr>
             <p:ph idx="2" type="sldImg"/>
@@ -2477,7 +2477,7 @@
       </p:sp>
       <p:sp>
         <p:nvSpPr>
-          <p:cNvPr id="133" name="Google Shape;133;g349490f2b00_0_0:notes"/>
+          <p:cNvPr id="135" name="Google Shape;135;g349490f2b00_0_0:notes"/>
           <p:cNvSpPr txBox="1"/>
           <p:nvPr>
             <p:ph idx="1" type="body"/>
@@ -7362,7 +7362,7 @@
   <p:cSld>
     <p:spTree>
       <p:nvGrpSpPr>
-        <p:cNvPr id="147" name="Shape 147"/>
+        <p:cNvPr id="149" name="Shape 149"/>
         <p:cNvGrpSpPr/>
         <p:nvPr/>
       </p:nvGrpSpPr>
@@ -7376,7 +7376,7 @@
       </p:grpSpPr>
       <p:sp>
         <p:nvSpPr>
-          <p:cNvPr id="148" name="Google Shape;148;p22"/>
+          <p:cNvPr id="150" name="Google Shape;150;p22"/>
           <p:cNvSpPr txBox="1"/>
           <p:nvPr>
             <p:ph type="title"/>
@@ -7425,7 +7425,7 @@
       </p:sp>
       <p:sp>
         <p:nvSpPr>
-          <p:cNvPr id="149" name="Google Shape;149;p22"/>
+          <p:cNvPr id="151" name="Google Shape;151;p22"/>
           <p:cNvSpPr txBox="1"/>
           <p:nvPr>
             <p:ph idx="12" type="sldNum"/>
@@ -7465,7 +7465,7 @@
       </p:sp>
       <p:pic>
         <p:nvPicPr>
-          <p:cNvPr id="150" name="Google Shape;150;p22"/>
+          <p:cNvPr id="152" name="Google Shape;152;p22"/>
           <p:cNvPicPr preferRelativeResize="0"/>
           <p:nvPr/>
         </p:nvPicPr>
@@ -7504,7 +7504,7 @@
   <p:cSld>
     <p:spTree>
       <p:nvGrpSpPr>
-        <p:cNvPr id="154" name="Shape 154"/>
+        <p:cNvPr id="156" name="Shape 156"/>
         <p:cNvGrpSpPr/>
         <p:nvPr/>
       </p:nvGrpSpPr>
@@ -7518,7 +7518,7 @@
       </p:grpSpPr>
       <p:sp>
         <p:nvSpPr>
-          <p:cNvPr id="155" name="Google Shape;155;p23"/>
+          <p:cNvPr id="157" name="Google Shape;157;p23"/>
           <p:cNvSpPr txBox="1"/>
           <p:nvPr>
             <p:ph type="title"/>
@@ -7575,7 +7575,7 @@
       </p:sp>
       <p:sp>
         <p:nvSpPr>
-          <p:cNvPr id="156" name="Google Shape;156;p23"/>
+          <p:cNvPr id="158" name="Google Shape;158;p23"/>
           <p:cNvSpPr txBox="1"/>
           <p:nvPr>
             <p:ph idx="12" type="sldNum"/>
@@ -7626,7 +7626,7 @@
   <p:cSld>
     <p:spTree>
       <p:nvGrpSpPr>
-        <p:cNvPr id="160" name="Shape 160"/>
+        <p:cNvPr id="162" name="Shape 162"/>
         <p:cNvGrpSpPr/>
         <p:nvPr/>
       </p:nvGrpSpPr>
@@ -7640,7 +7640,7 @@
       </p:grpSpPr>
       <p:sp>
         <p:nvSpPr>
-          <p:cNvPr id="161" name="Google Shape;161;p24"/>
+          <p:cNvPr id="163" name="Google Shape;163;p24"/>
           <p:cNvSpPr txBox="1"/>
           <p:nvPr>
             <p:ph type="title"/>
@@ -7648,7 +7648,7 @@
         </p:nvSpPr>
         <p:spPr>
           <a:xfrm>
-            <a:off x="311700" y="445025"/>
+            <a:off x="310500" y="328325"/>
             <a:ext cx="8520600" cy="572700"/>
           </a:xfrm>
           <a:prstGeom prst="rect">
@@ -7657,34 +7657,48 @@
         </p:spPr>
         <p:txBody>
           <a:bodyPr anchorCtr="0" anchor="t" bIns="91425" lIns="91425" spcFirstLastPara="1" rIns="91425" wrap="square" tIns="91425">
-            <a:normAutofit fontScale="90000"/>
+            <a:normAutofit/>
           </a:bodyPr>
           <a:lstStyle/>
           <a:p>
-            <a:pPr indent="0" lvl="0" marL="0" rtl="0" algn="l">
-              <a:spcBef>
-                <a:spcPts val="0"/>
-              </a:spcBef>
-              <a:spcAft>
-                <a:spcPts val="0"/>
-              </a:spcAft>
+            <a:pPr indent="0" lvl="0" marL="0" marR="0" rtl="0" algn="l">
+              <a:lnSpc>
+                <a:spcPct val="100000"/>
+              </a:lnSpc>
+              <a:spcBef>
+                <a:spcPts val="0"/>
+              </a:spcBef>
+              <a:spcAft>
+                <a:spcPts val="0"/>
+              </a:spcAft>
+              <a:buClr>
+                <a:srgbClr val="000000"/>
+              </a:buClr>
+              <a:buSzPts val="990"/>
+              <a:buFont typeface="Arial"/>
               <a:buNone/>
             </a:pPr>
             <a:r>
-              <a:rPr lang="en"/>
-              <a:t>Hybrid-Solver - </a:t>
+              <a:rPr lang="en" sz="2240">
+                <a:latin typeface="Roboto Mono Medium"/>
+                <a:ea typeface="Roboto Mono Medium"/>
+                <a:cs typeface="Roboto Mono Medium"/>
+                <a:sym typeface="Roboto Mono Medium"/>
+              </a:rPr>
+              <a:t>Hybrid-Solver - Solving Process</a:t>
             </a:r>
-            <a:r>
-              <a:rPr lang="en"/>
-              <a:t>Solving Process</a:t>
-            </a:r>
-            <a:endParaRPr/>
+            <a:endParaRPr sz="2240">
+              <a:latin typeface="Roboto Mono Medium"/>
+              <a:ea typeface="Roboto Mono Medium"/>
+              <a:cs typeface="Roboto Mono Medium"/>
+              <a:sym typeface="Roboto Mono Medium"/>
+            </a:endParaRPr>
           </a:p>
         </p:txBody>
       </p:sp>
       <p:sp>
         <p:nvSpPr>
-          <p:cNvPr id="162" name="Google Shape;162;p24"/>
+          <p:cNvPr id="164" name="Google Shape;164;p24"/>
           <p:cNvSpPr txBox="1"/>
           <p:nvPr>
             <p:ph idx="1" type="body"/>
@@ -7723,7 +7737,7 @@
       </p:sp>
       <p:sp>
         <p:nvSpPr>
-          <p:cNvPr id="163" name="Google Shape;163;p24"/>
+          <p:cNvPr id="165" name="Google Shape;165;p24"/>
           <p:cNvSpPr txBox="1"/>
           <p:nvPr>
             <p:ph idx="12" type="sldNum"/>
@@ -7763,7 +7777,7 @@
       </p:sp>
       <p:sp>
         <p:nvSpPr>
-          <p:cNvPr id="164" name="Google Shape;164;p24"/>
+          <p:cNvPr id="166" name="Google Shape;166;p24"/>
           <p:cNvSpPr/>
           <p:nvPr/>
         </p:nvSpPr>
@@ -7808,7 +7822,7 @@
       </p:sp>
       <p:sp>
         <p:nvSpPr>
-          <p:cNvPr id="165" name="Google Shape;165;p24"/>
+          <p:cNvPr id="167" name="Google Shape;167;p24"/>
           <p:cNvSpPr txBox="1"/>
           <p:nvPr/>
         </p:nvSpPr>
@@ -7865,7 +7879,7 @@
       </p:sp>
       <p:grpSp>
         <p:nvGrpSpPr>
-          <p:cNvPr id="166" name="Google Shape;166;p24"/>
+          <p:cNvPr id="168" name="Google Shape;168;p24"/>
           <p:cNvGrpSpPr/>
           <p:nvPr/>
         </p:nvGrpSpPr>
@@ -7879,7 +7893,7 @@
         </p:grpSpPr>
         <p:sp>
           <p:nvSpPr>
-            <p:cNvPr id="167" name="Google Shape;167;p24"/>
+            <p:cNvPr id="169" name="Google Shape;169;p24"/>
             <p:cNvSpPr/>
             <p:nvPr/>
           </p:nvSpPr>
@@ -7925,7 +7939,7 @@
         </p:sp>
         <p:sp>
           <p:nvSpPr>
-            <p:cNvPr id="168" name="Google Shape;168;p24"/>
+            <p:cNvPr id="170" name="Google Shape;170;p24"/>
             <p:cNvSpPr txBox="1"/>
             <p:nvPr/>
           </p:nvSpPr>
@@ -7982,7 +7996,7 @@
         </p:sp>
         <p:sp>
           <p:nvSpPr>
-            <p:cNvPr id="169" name="Google Shape;169;p24"/>
+            <p:cNvPr id="171" name="Google Shape;171;p24"/>
             <p:cNvSpPr/>
             <p:nvPr/>
           </p:nvSpPr>
@@ -8050,7 +8064,7 @@
       </p:grpSp>
       <p:grpSp>
         <p:nvGrpSpPr>
-          <p:cNvPr id="170" name="Google Shape;170;p24"/>
+          <p:cNvPr id="172" name="Google Shape;172;p24"/>
           <p:cNvGrpSpPr/>
           <p:nvPr/>
         </p:nvGrpSpPr>
@@ -8064,7 +8078,7 @@
         </p:grpSpPr>
         <p:sp>
           <p:nvSpPr>
-            <p:cNvPr id="171" name="Google Shape;171;p24"/>
+            <p:cNvPr id="173" name="Google Shape;173;p24"/>
             <p:cNvSpPr/>
             <p:nvPr/>
           </p:nvSpPr>
@@ -8110,7 +8124,7 @@
         </p:sp>
         <p:sp>
           <p:nvSpPr>
-            <p:cNvPr id="172" name="Google Shape;172;p24"/>
+            <p:cNvPr id="174" name="Google Shape;174;p24"/>
             <p:cNvSpPr txBox="1"/>
             <p:nvPr/>
           </p:nvSpPr>
@@ -8167,7 +8181,7 @@
         </p:sp>
         <p:sp>
           <p:nvSpPr>
-            <p:cNvPr id="173" name="Google Shape;173;p24"/>
+            <p:cNvPr id="175" name="Google Shape;175;p24"/>
             <p:cNvSpPr/>
             <p:nvPr/>
           </p:nvSpPr>
@@ -8235,7 +8249,7 @@
       </p:grpSp>
       <p:grpSp>
         <p:nvGrpSpPr>
-          <p:cNvPr id="174" name="Google Shape;174;p24"/>
+          <p:cNvPr id="176" name="Google Shape;176;p24"/>
           <p:cNvGrpSpPr/>
           <p:nvPr/>
         </p:nvGrpSpPr>
@@ -8249,7 +8263,7 @@
         </p:grpSpPr>
         <p:sp>
           <p:nvSpPr>
-            <p:cNvPr id="175" name="Google Shape;175;p24"/>
+            <p:cNvPr id="177" name="Google Shape;177;p24"/>
             <p:cNvSpPr/>
             <p:nvPr/>
           </p:nvSpPr>
@@ -8295,7 +8309,7 @@
         </p:sp>
         <p:sp>
           <p:nvSpPr>
-            <p:cNvPr id="176" name="Google Shape;176;p24"/>
+            <p:cNvPr id="178" name="Google Shape;178;p24"/>
             <p:cNvSpPr/>
             <p:nvPr/>
           </p:nvSpPr>
@@ -8362,7 +8376,7 @@
         </p:sp>
         <p:sp>
           <p:nvSpPr>
-            <p:cNvPr id="177" name="Google Shape;177;p24"/>
+            <p:cNvPr id="179" name="Google Shape;179;p24"/>
             <p:cNvSpPr txBox="1"/>
             <p:nvPr/>
           </p:nvSpPr>
@@ -8420,7 +8434,7 @@
       </p:grpSp>
       <p:cxnSp>
         <p:nvCxnSpPr>
-          <p:cNvPr id="178" name="Google Shape;178;p24"/>
+          <p:cNvPr id="180" name="Google Shape;180;p24"/>
           <p:cNvCxnSpPr/>
           <p:nvPr/>
         </p:nvCxnSpPr>
@@ -8446,7 +8460,7 @@
       </p:cxnSp>
       <p:sp>
         <p:nvSpPr>
-          <p:cNvPr id="179" name="Google Shape;179;p24"/>
+          <p:cNvPr id="181" name="Google Shape;181;p24"/>
           <p:cNvSpPr txBox="1"/>
           <p:nvPr/>
         </p:nvSpPr>
@@ -8526,7 +8540,7 @@
       </p:sp>
       <p:cxnSp>
         <p:nvCxnSpPr>
-          <p:cNvPr id="180" name="Google Shape;180;p24"/>
+          <p:cNvPr id="182" name="Google Shape;182;p24"/>
           <p:cNvCxnSpPr/>
           <p:nvPr/>
         </p:nvCxnSpPr>
@@ -8552,7 +8566,7 @@
       </p:cxnSp>
       <p:sp>
         <p:nvSpPr>
-          <p:cNvPr id="181" name="Google Shape;181;p24"/>
+          <p:cNvPr id="183" name="Google Shape;183;p24"/>
           <p:cNvSpPr txBox="1"/>
           <p:nvPr/>
         </p:nvSpPr>
@@ -8619,7 +8633,7 @@
   <p:cSld>
     <p:spTree>
       <p:nvGrpSpPr>
-        <p:cNvPr id="185" name="Shape 185"/>
+        <p:cNvPr id="187" name="Shape 187"/>
         <p:cNvGrpSpPr/>
         <p:nvPr/>
       </p:nvGrpSpPr>
@@ -8633,7 +8647,7 @@
       </p:grpSpPr>
       <p:sp>
         <p:nvSpPr>
-          <p:cNvPr id="186" name="Google Shape;186;p25"/>
+          <p:cNvPr id="188" name="Google Shape;188;p25"/>
           <p:cNvSpPr txBox="1"/>
           <p:nvPr>
             <p:ph type="title"/>
@@ -8641,7 +8655,7 @@
         </p:nvSpPr>
         <p:spPr>
           <a:xfrm>
-            <a:off x="311700" y="445025"/>
+            <a:off x="235500" y="366875"/>
             <a:ext cx="8520600" cy="572700"/>
           </a:xfrm>
           <a:prstGeom prst="rect">
@@ -8650,11 +8664,14 @@
         </p:spPr>
         <p:txBody>
           <a:bodyPr anchorCtr="0" anchor="t" bIns="91425" lIns="91425" spcFirstLastPara="1" rIns="91425" wrap="square" tIns="91425">
-            <a:normAutofit fontScale="90000"/>
+            <a:normAutofit/>
           </a:bodyPr>
           <a:lstStyle/>
           <a:p>
-            <a:pPr indent="0" lvl="0" marL="0" rtl="0" algn="l">
+            <a:pPr indent="0" lvl="0" marL="0" marR="0" rtl="0" algn="l">
+              <a:lnSpc>
+                <a:spcPct val="100000"/>
+              </a:lnSpc>
               <a:spcBef>
                 <a:spcPts val="0"/>
               </a:spcBef>
@@ -8664,24 +8681,44 @@
               <a:buNone/>
             </a:pPr>
             <a:r>
-              <a:rPr lang="en"/>
+              <a:rPr lang="en" sz="2240">
+                <a:latin typeface="Roboto Mono Medium"/>
+                <a:ea typeface="Roboto Mono Medium"/>
+                <a:cs typeface="Roboto Mono Medium"/>
+                <a:sym typeface="Roboto Mono Medium"/>
+              </a:rPr>
               <a:t>LLM Strategic Decision Making</a:t>
             </a:r>
             <a:r>
-              <a:rPr lang="en"/>
+              <a:rPr lang="en" sz="2240">
+                <a:latin typeface="Roboto Mono Medium"/>
+                <a:ea typeface="Roboto Mono Medium"/>
+                <a:cs typeface="Roboto Mono Medium"/>
+                <a:sym typeface="Roboto Mono Medium"/>
+              </a:rPr>
               <a:t> </a:t>
             </a:r>
             <a:r>
-              <a:rPr lang="en"/>
+              <a:rPr lang="en" sz="2240">
+                <a:latin typeface="Roboto Mono Medium"/>
+                <a:ea typeface="Roboto Mono Medium"/>
+                <a:cs typeface="Roboto Mono Medium"/>
+                <a:sym typeface="Roboto Mono Medium"/>
+              </a:rPr>
               <a:t> </a:t>
             </a:r>
-            <a:endParaRPr/>
+            <a:endParaRPr sz="2240">
+              <a:latin typeface="Roboto Mono Medium"/>
+              <a:ea typeface="Roboto Mono Medium"/>
+              <a:cs typeface="Roboto Mono Medium"/>
+              <a:sym typeface="Roboto Mono Medium"/>
+            </a:endParaRPr>
           </a:p>
         </p:txBody>
       </p:sp>
       <p:sp>
         <p:nvSpPr>
-          <p:cNvPr id="187" name="Google Shape;187;p25"/>
+          <p:cNvPr id="189" name="Google Shape;189;p25"/>
           <p:cNvSpPr txBox="1"/>
           <p:nvPr>
             <p:ph idx="1" type="body"/>
@@ -8720,7 +8757,7 @@
       </p:sp>
       <p:sp>
         <p:nvSpPr>
-          <p:cNvPr id="188" name="Google Shape;188;p25"/>
+          <p:cNvPr id="190" name="Google Shape;190;p25"/>
           <p:cNvSpPr txBox="1"/>
           <p:nvPr>
             <p:ph idx="12" type="sldNum"/>
@@ -8760,10 +8797,10 @@
       </p:sp>
       <p:cxnSp>
         <p:nvCxnSpPr>
-          <p:cNvPr id="189" name="Google Shape;189;p25"/>
+          <p:cNvPr id="191" name="Google Shape;191;p25"/>
           <p:cNvCxnSpPr>
-            <a:stCxn id="190" idx="6"/>
-            <a:endCxn id="191" idx="2"/>
+            <a:stCxn id="192" idx="6"/>
+            <a:endCxn id="193" idx="2"/>
           </p:cNvCxnSpPr>
           <p:nvPr/>
         </p:nvCxnSpPr>
@@ -8791,10 +8828,10 @@
       </p:cxnSp>
       <p:cxnSp>
         <p:nvCxnSpPr>
-          <p:cNvPr id="192" name="Google Shape;192;p25"/>
+          <p:cNvPr id="194" name="Google Shape;194;p25"/>
           <p:cNvCxnSpPr>
-            <a:stCxn id="190" idx="6"/>
-            <a:endCxn id="193" idx="2"/>
+            <a:stCxn id="192" idx="6"/>
+            <a:endCxn id="195" idx="2"/>
           </p:cNvCxnSpPr>
           <p:nvPr/>
         </p:nvCxnSpPr>
@@ -8822,10 +8859,10 @@
       </p:cxnSp>
       <p:cxnSp>
         <p:nvCxnSpPr>
-          <p:cNvPr id="194" name="Google Shape;194;p25"/>
+          <p:cNvPr id="196" name="Google Shape;196;p25"/>
           <p:cNvCxnSpPr>
-            <a:stCxn id="195" idx="3"/>
-            <a:endCxn id="196" idx="2"/>
+            <a:stCxn id="197" idx="3"/>
+            <a:endCxn id="198" idx="2"/>
           </p:cNvCxnSpPr>
           <p:nvPr/>
         </p:nvCxnSpPr>
@@ -8853,10 +8890,10 @@
       </p:cxnSp>
       <p:cxnSp>
         <p:nvCxnSpPr>
-          <p:cNvPr id="197" name="Google Shape;197;p25"/>
+          <p:cNvPr id="199" name="Google Shape;199;p25"/>
           <p:cNvCxnSpPr>
-            <a:stCxn id="195" idx="3"/>
-            <a:endCxn id="198" idx="2"/>
+            <a:stCxn id="197" idx="3"/>
+            <a:endCxn id="200" idx="2"/>
           </p:cNvCxnSpPr>
           <p:nvPr/>
         </p:nvCxnSpPr>
@@ -8884,10 +8921,10 @@
       </p:cxnSp>
       <p:cxnSp>
         <p:nvCxnSpPr>
-          <p:cNvPr id="199" name="Google Shape;199;p25"/>
+          <p:cNvPr id="201" name="Google Shape;201;p25"/>
           <p:cNvCxnSpPr>
-            <a:stCxn id="200" idx="3"/>
-            <a:endCxn id="201" idx="1"/>
+            <a:stCxn id="202" idx="3"/>
+            <a:endCxn id="203" idx="1"/>
           </p:cNvCxnSpPr>
           <p:nvPr/>
         </p:nvCxnSpPr>
@@ -8915,7 +8952,7 @@
       </p:cxnSp>
       <p:grpSp>
         <p:nvGrpSpPr>
-          <p:cNvPr id="202" name="Google Shape;202;p25"/>
+          <p:cNvPr id="204" name="Google Shape;204;p25"/>
           <p:cNvGrpSpPr/>
           <p:nvPr/>
         </p:nvGrpSpPr>
@@ -8929,7 +8966,7 @@
         </p:grpSpPr>
         <p:sp>
           <p:nvSpPr>
-            <p:cNvPr id="203" name="Google Shape;203;p25"/>
+            <p:cNvPr id="205" name="Google Shape;205;p25"/>
             <p:cNvSpPr/>
             <p:nvPr/>
           </p:nvSpPr>
@@ -9013,7 +9050,7 @@
         </p:sp>
         <p:sp>
           <p:nvSpPr>
-            <p:cNvPr id="196" name="Google Shape;196;p25"/>
+            <p:cNvPr id="198" name="Google Shape;198;p25"/>
             <p:cNvSpPr/>
             <p:nvPr/>
           </p:nvSpPr>
@@ -9057,7 +9094,7 @@
       </p:grpSp>
       <p:grpSp>
         <p:nvGrpSpPr>
-          <p:cNvPr id="204" name="Google Shape;204;p25"/>
+          <p:cNvPr id="206" name="Google Shape;206;p25"/>
           <p:cNvGrpSpPr/>
           <p:nvPr/>
         </p:nvGrpSpPr>
@@ -9071,7 +9108,7 @@
         </p:grpSpPr>
         <p:sp>
           <p:nvSpPr>
-            <p:cNvPr id="195" name="Google Shape;195;p25"/>
+            <p:cNvPr id="197" name="Google Shape;197;p25"/>
             <p:cNvSpPr/>
             <p:nvPr/>
           </p:nvSpPr>
@@ -9131,7 +9168,7 @@
         </p:sp>
         <p:sp>
           <p:nvSpPr>
-            <p:cNvPr id="193" name="Google Shape;193;p25"/>
+            <p:cNvPr id="195" name="Google Shape;195;p25"/>
             <p:cNvSpPr/>
             <p:nvPr/>
           </p:nvSpPr>
@@ -9175,7 +9212,7 @@
       </p:grpSp>
       <p:grpSp>
         <p:nvGrpSpPr>
-          <p:cNvPr id="205" name="Google Shape;205;p25"/>
+          <p:cNvPr id="207" name="Google Shape;207;p25"/>
           <p:cNvGrpSpPr/>
           <p:nvPr/>
         </p:nvGrpSpPr>
@@ -9189,7 +9226,7 @@
         </p:grpSpPr>
         <p:sp>
           <p:nvSpPr>
-            <p:cNvPr id="206" name="Google Shape;206;p25"/>
+            <p:cNvPr id="208" name="Google Shape;208;p25"/>
             <p:cNvSpPr/>
             <p:nvPr/>
           </p:nvSpPr>
@@ -9249,7 +9286,7 @@
         </p:sp>
         <p:sp>
           <p:nvSpPr>
-            <p:cNvPr id="190" name="Google Shape;190;p25"/>
+            <p:cNvPr id="192" name="Google Shape;192;p25"/>
             <p:cNvSpPr/>
             <p:nvPr/>
           </p:nvSpPr>
@@ -9293,7 +9330,7 @@
       </p:grpSp>
       <p:grpSp>
         <p:nvGrpSpPr>
-          <p:cNvPr id="207" name="Google Shape;207;p25"/>
+          <p:cNvPr id="209" name="Google Shape;209;p25"/>
           <p:cNvGrpSpPr/>
           <p:nvPr/>
         </p:nvGrpSpPr>
@@ -9307,7 +9344,7 @@
         </p:grpSpPr>
         <p:sp>
           <p:nvSpPr>
-            <p:cNvPr id="200" name="Google Shape;200;p25"/>
+            <p:cNvPr id="202" name="Google Shape;202;p25"/>
             <p:cNvSpPr/>
             <p:nvPr/>
           </p:nvSpPr>
@@ -9395,7 +9432,7 @@
         </p:sp>
         <p:sp>
           <p:nvSpPr>
-            <p:cNvPr id="191" name="Google Shape;191;p25"/>
+            <p:cNvPr id="193" name="Google Shape;193;p25"/>
             <p:cNvSpPr/>
             <p:nvPr/>
           </p:nvSpPr>
@@ -9439,7 +9476,7 @@
       </p:grpSp>
       <p:grpSp>
         <p:nvGrpSpPr>
-          <p:cNvPr id="208" name="Google Shape;208;p25"/>
+          <p:cNvPr id="210" name="Google Shape;210;p25"/>
           <p:cNvGrpSpPr/>
           <p:nvPr/>
         </p:nvGrpSpPr>
@@ -9453,7 +9490,7 @@
         </p:grpSpPr>
         <p:sp>
           <p:nvSpPr>
-            <p:cNvPr id="209" name="Google Shape;209;p25"/>
+            <p:cNvPr id="211" name="Google Shape;211;p25"/>
             <p:cNvSpPr/>
             <p:nvPr/>
           </p:nvSpPr>
@@ -9513,7 +9550,7 @@
         </p:sp>
         <p:sp>
           <p:nvSpPr>
-            <p:cNvPr id="198" name="Google Shape;198;p25"/>
+            <p:cNvPr id="200" name="Google Shape;200;p25"/>
             <p:cNvSpPr/>
             <p:nvPr/>
           </p:nvSpPr>
@@ -9557,7 +9594,7 @@
       </p:grpSp>
       <p:grpSp>
         <p:nvGrpSpPr>
-          <p:cNvPr id="210" name="Google Shape;210;p25"/>
+          <p:cNvPr id="212" name="Google Shape;212;p25"/>
           <p:cNvGrpSpPr/>
           <p:nvPr/>
         </p:nvGrpSpPr>
@@ -9571,7 +9608,7 @@
         </p:grpSpPr>
         <p:sp>
           <p:nvSpPr>
-            <p:cNvPr id="201" name="Google Shape;201;p25"/>
+            <p:cNvPr id="203" name="Google Shape;203;p25"/>
             <p:cNvSpPr/>
             <p:nvPr/>
           </p:nvSpPr>
@@ -9631,7 +9668,7 @@
         </p:sp>
         <p:sp>
           <p:nvSpPr>
-            <p:cNvPr id="211" name="Google Shape;211;p25"/>
+            <p:cNvPr id="213" name="Google Shape;213;p25"/>
             <p:cNvSpPr/>
             <p:nvPr/>
           </p:nvSpPr>
@@ -9675,7 +9712,7 @@
       </p:grpSp>
       <p:sp>
         <p:nvSpPr>
-          <p:cNvPr id="212" name="Google Shape;212;p25"/>
+          <p:cNvPr id="214" name="Google Shape;214;p25"/>
           <p:cNvSpPr/>
           <p:nvPr/>
         </p:nvSpPr>
@@ -9726,7 +9763,7 @@
       </p:sp>
       <p:sp>
         <p:nvSpPr>
-          <p:cNvPr id="213" name="Google Shape;213;p25"/>
+          <p:cNvPr id="215" name="Google Shape;215;p25"/>
           <p:cNvSpPr/>
           <p:nvPr/>
         </p:nvSpPr>
@@ -9786,7 +9823,7 @@
       </p:sp>
       <p:sp>
         <p:nvSpPr>
-          <p:cNvPr id="214" name="Google Shape;214;p25"/>
+          <p:cNvPr id="216" name="Google Shape;216;p25"/>
           <p:cNvSpPr/>
           <p:nvPr/>
         </p:nvSpPr>
@@ -9835,10 +9872,10 @@
       </p:sp>
       <p:cxnSp>
         <p:nvCxnSpPr>
-          <p:cNvPr id="215" name="Google Shape;215;p25"/>
+          <p:cNvPr id="217" name="Google Shape;217;p25"/>
           <p:cNvCxnSpPr>
-            <a:stCxn id="209" idx="0"/>
-            <a:endCxn id="214" idx="2"/>
+            <a:stCxn id="211" idx="0"/>
+            <a:endCxn id="216" idx="2"/>
           </p:cNvCxnSpPr>
           <p:nvPr/>
         </p:nvCxnSpPr>
@@ -9864,10 +9901,10 @@
       </p:cxnSp>
       <p:cxnSp>
         <p:nvCxnSpPr>
-          <p:cNvPr id="216" name="Google Shape;216;p25"/>
+          <p:cNvPr id="218" name="Google Shape;218;p25"/>
           <p:cNvCxnSpPr>
-            <a:stCxn id="203" idx="2"/>
-            <a:endCxn id="214" idx="2"/>
+            <a:stCxn id="205" idx="2"/>
+            <a:endCxn id="216" idx="2"/>
           </p:cNvCxnSpPr>
           <p:nvPr/>
         </p:nvCxnSpPr>
@@ -9893,7 +9930,7 @@
       </p:cxnSp>
       <p:sp>
         <p:nvSpPr>
-          <p:cNvPr id="217" name="Google Shape;217;p25"/>
+          <p:cNvPr id="219" name="Google Shape;219;p25"/>
           <p:cNvSpPr/>
           <p:nvPr/>
         </p:nvSpPr>
@@ -9936,7 +9973,7 @@
       </p:sp>
       <p:sp>
         <p:nvSpPr>
-          <p:cNvPr id="218" name="Google Shape;218;p25"/>
+          <p:cNvPr id="220" name="Google Shape;220;p25"/>
           <p:cNvSpPr/>
           <p:nvPr/>
         </p:nvSpPr>
@@ -9987,7 +10024,7 @@
       </p:sp>
       <p:sp>
         <p:nvSpPr>
-          <p:cNvPr id="219" name="Google Shape;219;p25"/>
+          <p:cNvPr id="221" name="Google Shape;221;p25"/>
           <p:cNvSpPr/>
           <p:nvPr/>
         </p:nvSpPr>
@@ -10030,7 +10067,7 @@
       </p:sp>
       <p:sp>
         <p:nvSpPr>
-          <p:cNvPr id="220" name="Google Shape;220;p25"/>
+          <p:cNvPr id="222" name="Google Shape;222;p25"/>
           <p:cNvSpPr/>
           <p:nvPr/>
         </p:nvSpPr>
@@ -10104,7 +10141,7 @@
   <p:cSld>
     <p:spTree>
       <p:nvGrpSpPr>
-        <p:cNvPr id="224" name="Shape 224"/>
+        <p:cNvPr id="226" name="Shape 226"/>
         <p:cNvGrpSpPr/>
         <p:nvPr/>
       </p:nvGrpSpPr>
@@ -10118,7 +10155,7 @@
       </p:grpSpPr>
       <p:sp>
         <p:nvSpPr>
-          <p:cNvPr id="225" name="Google Shape;225;p26"/>
+          <p:cNvPr id="227" name="Google Shape;227;p26"/>
           <p:cNvSpPr txBox="1"/>
           <p:nvPr>
             <p:ph type="title"/>
@@ -10126,7 +10163,7 @@
         </p:nvSpPr>
         <p:spPr>
           <a:xfrm>
-            <a:off x="311700" y="445025"/>
+            <a:off x="235500" y="270100"/>
             <a:ext cx="8520600" cy="572700"/>
           </a:xfrm>
           <a:prstGeom prst="rect">
@@ -10150,15 +10187,29 @@
             </a:pPr>
             <a:r>
               <a:rPr lang="en"/>
-              <a:t> Hybrid-Solver Demo</a:t>
+              <a:t> </a:t>
             </a:r>
-            <a:endParaRPr/>
+            <a:r>
+              <a:rPr lang="en" sz="2240">
+                <a:latin typeface="Roboto Mono Medium"/>
+                <a:ea typeface="Roboto Mono Medium"/>
+                <a:cs typeface="Roboto Mono Medium"/>
+                <a:sym typeface="Roboto Mono Medium"/>
+              </a:rPr>
+              <a:t>Hybrid-Solver Demo</a:t>
+            </a:r>
+            <a:endParaRPr sz="2240">
+              <a:latin typeface="Roboto Mono Medium"/>
+              <a:ea typeface="Roboto Mono Medium"/>
+              <a:cs typeface="Roboto Mono Medium"/>
+              <a:sym typeface="Roboto Mono Medium"/>
+            </a:endParaRPr>
           </a:p>
         </p:txBody>
       </p:sp>
       <p:sp>
         <p:nvSpPr>
-          <p:cNvPr id="226" name="Google Shape;226;p26"/>
+          <p:cNvPr id="228" name="Google Shape;228;p26"/>
           <p:cNvSpPr txBox="1"/>
           <p:nvPr>
             <p:ph idx="1" type="body"/>
@@ -10197,7 +10248,7 @@
       </p:sp>
       <p:sp>
         <p:nvSpPr>
-          <p:cNvPr id="227" name="Google Shape;227;p26"/>
+          <p:cNvPr id="229" name="Google Shape;229;p26"/>
           <p:cNvSpPr txBox="1"/>
           <p:nvPr>
             <p:ph idx="12" type="sldNum"/>
@@ -10237,7 +10288,7 @@
       </p:sp>
       <p:pic>
         <p:nvPicPr>
-          <p:cNvPr id="228" name="Google Shape;228;p26" title="Demo-Hybrid.mov">
+          <p:cNvPr id="230" name="Google Shape;230;p26" title="Demo-Hybrid.mov">
             <a:hlinkClick r:id="rId3"/>
           </p:cNvPr>
           <p:cNvPicPr preferRelativeResize="0"/>
@@ -10267,7 +10318,7 @@
       </p:pic>
       <p:pic>
         <p:nvPicPr>
-          <p:cNvPr id="229" name="Google Shape;229;p26" title="L-10-solver.mov">
+          <p:cNvPr id="231" name="Google Shape;231;p26" title="L-10-solver.mov">
             <a:hlinkClick r:id="rId5"/>
           </p:cNvPr>
           <p:cNvPicPr preferRelativeResize="0"/>
@@ -10334,7 +10385,7 @@
                                           </p:stCondLst>
                                         </p:cTn>
                                         <p:tgtEl>
-                                          <p:spTgt spid="228"/>
+                                          <p:spTgt spid="230"/>
                                         </p:tgtEl>
                                         <p:attrNameLst>
                                           <p:attrName>style.visibility</p:attrName>
@@ -10348,7 +10399,7 @@
                                       <p:cBhvr>
                                         <p:cTn dur="1000"/>
                                         <p:tgtEl>
-                                          <p:spTgt spid="228"/>
+                                          <p:spTgt spid="230"/>
                                         </p:tgtEl>
                                       </p:cBhvr>
                                     </p:animEffect>
@@ -10387,7 +10438,7 @@
                                           </p:stCondLst>
                                         </p:cTn>
                                         <p:tgtEl>
-                                          <p:spTgt spid="229"/>
+                                          <p:spTgt spid="231"/>
                                         </p:tgtEl>
                                         <p:attrNameLst>
                                           <p:attrName>style.visibility</p:attrName>
@@ -10401,7 +10452,7 @@
                                       <p:cBhvr>
                                         <p:cTn dur="1000"/>
                                         <p:tgtEl>
-                                          <p:spTgt spid="229"/>
+                                          <p:spTgt spid="231"/>
                                         </p:tgtEl>
                                       </p:cBhvr>
                                     </p:animEffect>
@@ -10444,7 +10495,7 @@
   <p:cSld>
     <p:spTree>
       <p:nvGrpSpPr>
-        <p:cNvPr id="233" name="Shape 233"/>
+        <p:cNvPr id="235" name="Shape 235"/>
         <p:cNvGrpSpPr/>
         <p:nvPr/>
       </p:nvGrpSpPr>
@@ -10458,7 +10509,7 @@
       </p:grpSpPr>
       <p:sp>
         <p:nvSpPr>
-          <p:cNvPr id="234" name="Google Shape;234;p27"/>
+          <p:cNvPr id="236" name="Google Shape;236;p27"/>
           <p:cNvSpPr txBox="1"/>
           <p:nvPr>
             <p:ph type="title"/>
@@ -10515,7 +10566,7 @@
       </p:sp>
       <p:sp>
         <p:nvSpPr>
-          <p:cNvPr id="235" name="Google Shape;235;p27"/>
+          <p:cNvPr id="237" name="Google Shape;237;p27"/>
           <p:cNvSpPr txBox="1"/>
           <p:nvPr>
             <p:ph idx="12" type="sldNum"/>
@@ -10566,7 +10617,7 @@
   <p:cSld>
     <p:spTree>
       <p:nvGrpSpPr>
-        <p:cNvPr id="239" name="Shape 239"/>
+        <p:cNvPr id="241" name="Shape 241"/>
         <p:cNvGrpSpPr/>
         <p:nvPr/>
       </p:nvGrpSpPr>
@@ -10580,7 +10631,7 @@
       </p:grpSpPr>
       <p:sp>
         <p:nvSpPr>
-          <p:cNvPr id="240" name="Google Shape;240;p28"/>
+          <p:cNvPr id="242" name="Google Shape;242;p28"/>
           <p:cNvSpPr txBox="1"/>
           <p:nvPr>
             <p:ph type="title"/>
@@ -10629,7 +10680,7 @@
       </p:sp>
       <p:sp>
         <p:nvSpPr>
-          <p:cNvPr id="241" name="Google Shape;241;p28"/>
+          <p:cNvPr id="243" name="Google Shape;243;p28"/>
           <p:cNvSpPr txBox="1"/>
           <p:nvPr>
             <p:ph idx="12" type="sldNum"/>
@@ -10669,14 +10720,14 @@
       </p:sp>
       <p:sp>
         <p:nvSpPr>
-          <p:cNvPr id="242" name="Google Shape;242;p28"/>
+          <p:cNvPr id="244" name="Google Shape;244;p28"/>
           <p:cNvSpPr txBox="1"/>
           <p:nvPr/>
         </p:nvSpPr>
         <p:spPr>
           <a:xfrm>
-            <a:off x="627850" y="1310225"/>
-            <a:ext cx="3129000" cy="2375700"/>
+            <a:off x="735575" y="1310225"/>
+            <a:ext cx="3430200" cy="2605500"/>
           </a:xfrm>
           <a:prstGeom prst="rect">
             <a:avLst/>
@@ -10705,7 +10756,7 @@
               <a:buNone/>
             </a:pPr>
             <a:r>
-              <a:rPr b="1" lang="en" sz="1500" u="sng">
+              <a:rPr b="1" lang="en" sz="1600" u="sng">
                 <a:solidFill>
                   <a:srgbClr val="403F3F"/>
                 </a:solidFill>
@@ -10716,7 +10767,7 @@
               </a:rPr>
               <a:t>CSP Solver</a:t>
             </a:r>
-            <a:endParaRPr b="1" sz="1500" u="sng">
+            <a:endParaRPr b="1" sz="1600" u="sng">
               <a:solidFill>
                 <a:srgbClr val="403F3F"/>
               </a:solidFill>
@@ -10727,7 +10778,7 @@
             </a:endParaRPr>
           </a:p>
           <a:p>
-            <a:pPr indent="-311150" lvl="0" marL="457200" rtl="0" algn="l">
+            <a:pPr indent="-317500" lvl="0" marL="457200" rtl="0" algn="l">
               <a:lnSpc>
                 <a:spcPct val="115000"/>
               </a:lnSpc>
@@ -10740,12 +10791,12 @@
               <a:buClr>
                 <a:srgbClr val="403F3F"/>
               </a:buClr>
-              <a:buSzPts val="1300"/>
+              <a:buSzPts val="1400"/>
               <a:buFont typeface="Roboto Mono"/>
               <a:buChar char="-"/>
             </a:pPr>
             <a:r>
-              <a:rPr lang="en" sz="1300">
+              <a:rPr lang="en">
                 <a:solidFill>
                   <a:srgbClr val="403F3F"/>
                 </a:solidFill>
@@ -10756,7 +10807,7 @@
               </a:rPr>
               <a:t>Use bigger dataset</a:t>
             </a:r>
-            <a:endParaRPr sz="1300">
+            <a:endParaRPr>
               <a:solidFill>
                 <a:srgbClr val="403F3F"/>
               </a:solidFill>
@@ -10767,7 +10818,7 @@
             </a:endParaRPr>
           </a:p>
           <a:p>
-            <a:pPr indent="-311150" lvl="0" marL="457200" rtl="0" algn="l">
+            <a:pPr indent="-317500" lvl="0" marL="457200" rtl="0" algn="l">
               <a:lnSpc>
                 <a:spcPct val="115000"/>
               </a:lnSpc>
@@ -10780,12 +10831,12 @@
               <a:buClr>
                 <a:srgbClr val="403F3F"/>
               </a:buClr>
-              <a:buSzPts val="1300"/>
+              <a:buSzPts val="1400"/>
               <a:buFont typeface="Roboto Mono"/>
               <a:buChar char="-"/>
             </a:pPr>
             <a:r>
-              <a:rPr lang="en" sz="1300">
+              <a:rPr lang="en">
                 <a:solidFill>
                   <a:srgbClr val="403F3F"/>
                 </a:solidFill>
@@ -10796,7 +10847,7 @@
               </a:rPr>
               <a:t>Adversarial Filtering / Anti-Worst-Case</a:t>
             </a:r>
-            <a:endParaRPr sz="1300">
+            <a:endParaRPr>
               <a:solidFill>
                 <a:srgbClr val="403F3F"/>
               </a:solidFill>
@@ -10807,7 +10858,7 @@
             </a:endParaRPr>
           </a:p>
           <a:p>
-            <a:pPr indent="-311150" lvl="0" marL="457200" rtl="0" algn="l">
+            <a:pPr indent="-317500" lvl="0" marL="457200" rtl="0" algn="l">
               <a:lnSpc>
                 <a:spcPct val="115000"/>
               </a:lnSpc>
@@ -10820,12 +10871,12 @@
               <a:buClr>
                 <a:srgbClr val="403F3F"/>
               </a:buClr>
-              <a:buSzPts val="1300"/>
+              <a:buSzPts val="1400"/>
               <a:buFont typeface="Roboto Mono"/>
               <a:buChar char="-"/>
             </a:pPr>
             <a:r>
-              <a:rPr lang="en" sz="1300">
+              <a:rPr lang="en">
                 <a:solidFill>
                   <a:srgbClr val="403F3F"/>
                 </a:solidFill>
@@ -10836,7 +10887,7 @@
               </a:rPr>
               <a:t>Lookahead with Minimax Guessing</a:t>
             </a:r>
-            <a:endParaRPr sz="1300">
+            <a:endParaRPr>
               <a:solidFill>
                 <a:srgbClr val="403F3F"/>
               </a:solidFill>
@@ -10850,14 +10901,14 @@
       </p:sp>
       <p:sp>
         <p:nvSpPr>
-          <p:cNvPr id="243" name="Google Shape;243;p28"/>
+          <p:cNvPr id="245" name="Google Shape;245;p28"/>
           <p:cNvSpPr txBox="1"/>
           <p:nvPr/>
         </p:nvSpPr>
         <p:spPr>
           <a:xfrm>
-            <a:off x="5343450" y="1310225"/>
-            <a:ext cx="3129000" cy="2375700"/>
+            <a:off x="4839125" y="1328225"/>
+            <a:ext cx="3357300" cy="2569500"/>
           </a:xfrm>
           <a:prstGeom prst="rect">
             <a:avLst/>
@@ -10886,7 +10937,7 @@
               <a:buNone/>
             </a:pPr>
             <a:r>
-              <a:rPr b="1" lang="en" sz="1500" u="sng">
+              <a:rPr b="1" lang="en" sz="1600" u="sng">
                 <a:solidFill>
                   <a:srgbClr val="403F3F"/>
                 </a:solidFill>
@@ -10897,7 +10948,7 @@
               </a:rPr>
               <a:t>Hybrid-Solver</a:t>
             </a:r>
-            <a:endParaRPr b="1" sz="1500" u="sng">
+            <a:endParaRPr b="1" sz="1600" u="sng">
               <a:solidFill>
                 <a:srgbClr val="403F3F"/>
               </a:solidFill>
@@ -10908,7 +10959,7 @@
             </a:endParaRPr>
           </a:p>
           <a:p>
-            <a:pPr indent="-311150" lvl="0" marL="457200" rtl="0" algn="l">
+            <a:pPr indent="-317500" lvl="0" marL="457200" rtl="0" algn="l">
               <a:lnSpc>
                 <a:spcPct val="115000"/>
               </a:lnSpc>
@@ -10921,12 +10972,12 @@
               <a:buClr>
                 <a:srgbClr val="403F3F"/>
               </a:buClr>
-              <a:buSzPts val="1300"/>
+              <a:buSzPts val="1400"/>
               <a:buFont typeface="Roboto Mono"/>
               <a:buChar char="-"/>
             </a:pPr>
             <a:r>
-              <a:rPr lang="en" sz="1300">
+              <a:rPr lang="en">
                 <a:solidFill>
                   <a:srgbClr val="403F3F"/>
                 </a:solidFill>
@@ -10937,7 +10988,7 @@
               </a:rPr>
               <a:t>Optimize Information Gain methods</a:t>
             </a:r>
-            <a:endParaRPr sz="1300">
+            <a:endParaRPr>
               <a:solidFill>
                 <a:srgbClr val="403F3F"/>
               </a:solidFill>
@@ -10948,7 +10999,7 @@
             </a:endParaRPr>
           </a:p>
           <a:p>
-            <a:pPr indent="-311150" lvl="0" marL="457200" rtl="0" algn="l">
+            <a:pPr indent="-317500" lvl="0" marL="457200" rtl="0" algn="l">
               <a:lnSpc>
                 <a:spcPct val="115000"/>
               </a:lnSpc>
@@ -10961,12 +11012,12 @@
               <a:buClr>
                 <a:srgbClr val="403F3F"/>
               </a:buClr>
-              <a:buSzPts val="1300"/>
+              <a:buSzPts val="1400"/>
               <a:buFont typeface="Roboto Mono"/>
               <a:buChar char="-"/>
             </a:pPr>
             <a:r>
-              <a:rPr lang="en" sz="1300">
+              <a:rPr lang="en">
                 <a:solidFill>
                   <a:srgbClr val="403F3F"/>
                 </a:solidFill>
@@ -10977,7 +11028,7 @@
               </a:rPr>
               <a:t>Enhanced LLM Prompting</a:t>
             </a:r>
-            <a:endParaRPr sz="1300">
+            <a:endParaRPr>
               <a:solidFill>
                 <a:srgbClr val="403F3F"/>
               </a:solidFill>
@@ -11002,7 +11053,7 @@
   <p:cSld>
     <p:spTree>
       <p:nvGrpSpPr>
-        <p:cNvPr id="247" name="Shape 247"/>
+        <p:cNvPr id="249" name="Shape 249"/>
         <p:cNvGrpSpPr/>
         <p:nvPr/>
       </p:nvGrpSpPr>
@@ -11016,7 +11067,7 @@
       </p:grpSpPr>
       <p:sp>
         <p:nvSpPr>
-          <p:cNvPr id="248" name="Google Shape;248;p29"/>
+          <p:cNvPr id="250" name="Google Shape;250;p29"/>
           <p:cNvSpPr txBox="1"/>
           <p:nvPr>
             <p:ph type="title"/>
@@ -11073,7 +11124,7 @@
       </p:sp>
       <p:sp>
         <p:nvSpPr>
-          <p:cNvPr id="249" name="Google Shape;249;p29"/>
+          <p:cNvPr id="251" name="Google Shape;251;p29"/>
           <p:cNvSpPr txBox="1"/>
           <p:nvPr>
             <p:ph idx="12" type="sldNum"/>
@@ -11124,7 +11175,7 @@
   <p:cSld>
     <p:spTree>
       <p:nvGrpSpPr>
-        <p:cNvPr id="253" name="Shape 253"/>
+        <p:cNvPr id="255" name="Shape 255"/>
         <p:cNvGrpSpPr/>
         <p:nvPr/>
       </p:nvGrpSpPr>
@@ -11138,7 +11189,7 @@
       </p:grpSpPr>
       <p:sp>
         <p:nvSpPr>
-          <p:cNvPr id="254" name="Google Shape;254;p30"/>
+          <p:cNvPr id="256" name="Google Shape;256;p30"/>
           <p:cNvSpPr txBox="1"/>
           <p:nvPr>
             <p:ph type="title"/>
@@ -11195,7 +11246,7 @@
       </p:sp>
       <p:sp>
         <p:nvSpPr>
-          <p:cNvPr id="255" name="Google Shape;255;p30"/>
+          <p:cNvPr id="257" name="Google Shape;257;p30"/>
           <p:cNvSpPr txBox="1"/>
           <p:nvPr/>
         </p:nvSpPr>
@@ -11253,7 +11304,7 @@
       </p:sp>
       <p:sp>
         <p:nvSpPr>
-          <p:cNvPr id="256" name="Google Shape;256;p30"/>
+          <p:cNvPr id="258" name="Google Shape;258;p30"/>
           <p:cNvSpPr txBox="1"/>
           <p:nvPr/>
         </p:nvSpPr>
@@ -11311,7 +11362,7 @@
       </p:sp>
       <p:sp>
         <p:nvSpPr>
-          <p:cNvPr id="257" name="Google Shape;257;p30"/>
+          <p:cNvPr id="259" name="Google Shape;259;p30"/>
           <p:cNvSpPr txBox="1"/>
           <p:nvPr/>
         </p:nvSpPr>
@@ -11369,7 +11420,7 @@
       </p:sp>
       <p:sp>
         <p:nvSpPr>
-          <p:cNvPr id="258" name="Google Shape;258;p30"/>
+          <p:cNvPr id="260" name="Google Shape;260;p30"/>
           <p:cNvSpPr txBox="1"/>
           <p:nvPr/>
         </p:nvSpPr>
@@ -11427,7 +11478,7 @@
       </p:sp>
       <p:sp>
         <p:nvSpPr>
-          <p:cNvPr id="259" name="Google Shape;259;p30"/>
+          <p:cNvPr id="261" name="Google Shape;261;p30"/>
           <p:cNvSpPr txBox="1"/>
           <p:nvPr>
             <p:ph idx="12" type="sldNum"/>
@@ -11467,7 +11518,7 @@
       </p:sp>
       <p:sp>
         <p:nvSpPr>
-          <p:cNvPr id="260" name="Google Shape;260;p30"/>
+          <p:cNvPr id="262" name="Google Shape;262;p30"/>
           <p:cNvSpPr txBox="1"/>
           <p:nvPr/>
         </p:nvSpPr>
@@ -11561,7 +11612,7 @@
       </p:sp>
       <p:sp>
         <p:nvSpPr>
-          <p:cNvPr id="261" name="Google Shape;261;p30"/>
+          <p:cNvPr id="263" name="Google Shape;263;p30"/>
           <p:cNvSpPr txBox="1"/>
           <p:nvPr/>
         </p:nvSpPr>
@@ -11670,6 +11721,13 @@
           <a:prstGeom prst="rect">
             <a:avLst/>
           </a:prstGeom>
+          <a:effectLst>
+            <a:outerShdw blurRad="71438" rotWithShape="0" algn="bl" dir="2580000" dist="19050">
+              <a:srgbClr val="000000">
+                <a:alpha val="36000"/>
+              </a:srgbClr>
+            </a:outerShdw>
+          </a:effectLst>
         </p:spPr>
         <p:txBody>
           <a:bodyPr anchorCtr="0" anchor="b" bIns="91425" lIns="91425" spcFirstLastPara="1" rIns="91425" wrap="square" tIns="91425">
@@ -11743,7 +11801,7 @@
                 <a:cs typeface="Roboto Mono Medium"/>
                 <a:sym typeface="Roboto Mono Medium"/>
               </a:rPr>
-              <a:t>What's at the menu ?</a:t>
+              <a:t>What's on the menu ?</a:t>
             </a:r>
             <a:endParaRPr>
               <a:latin typeface="Roboto Mono Medium"/>
@@ -12250,7 +12308,7 @@
         </p:nvSpPr>
         <p:spPr>
           <a:xfrm>
-            <a:off x="72625" y="1152475"/>
+            <a:off x="148825" y="1152475"/>
             <a:ext cx="5915400" cy="3416400"/>
           </a:xfrm>
           <a:prstGeom prst="rect">
@@ -12389,13 +12447,22 @@
               <a:buChar char="❏"/>
             </a:pPr>
             <a:r>
+              <a:rPr b="1" lang="en" sz="1300">
+                <a:latin typeface="Roboto Mono"/>
+                <a:ea typeface="Roboto Mono"/>
+                <a:cs typeface="Roboto Mono"/>
+                <a:sym typeface="Roboto Mono"/>
+              </a:rPr>
+              <a:t>Gray </a:t>
+            </a:r>
+            <a:r>
               <a:rPr lang="en" sz="1300">
                 <a:latin typeface="Roboto Mono"/>
                 <a:ea typeface="Roboto Mono"/>
                 <a:cs typeface="Roboto Mono"/>
                 <a:sym typeface="Roboto Mono"/>
               </a:rPr>
-              <a:t>Gray - letter not in word</a:t>
+              <a:t>- letter not in word</a:t>
             </a:r>
             <a:endParaRPr sz="1300">
               <a:latin typeface="Roboto Mono"/>
@@ -12420,13 +12487,22 @@
               <a:buChar char="❏"/>
             </a:pPr>
             <a:r>
+              <a:rPr b="1" lang="en" sz="1300">
+                <a:latin typeface="Roboto Mono"/>
+                <a:ea typeface="Roboto Mono"/>
+                <a:cs typeface="Roboto Mono"/>
+                <a:sym typeface="Roboto Mono"/>
+              </a:rPr>
+              <a:t>Yellow </a:t>
+            </a:r>
+            <a:r>
               <a:rPr lang="en" sz="1300">
                 <a:latin typeface="Roboto Mono"/>
                 <a:ea typeface="Roboto Mono"/>
                 <a:cs typeface="Roboto Mono"/>
                 <a:sym typeface="Roboto Mono"/>
               </a:rPr>
-              <a:t>Yellow - in word but </a:t>
+              <a:t>- in word but </a:t>
             </a:r>
             <a:r>
               <a:rPr lang="en" sz="1300">
@@ -12460,13 +12536,22 @@
               <a:buChar char="❏"/>
             </a:pPr>
             <a:r>
+              <a:rPr b="1" lang="en" sz="1300">
+                <a:latin typeface="Roboto Mono"/>
+                <a:ea typeface="Roboto Mono"/>
+                <a:cs typeface="Roboto Mono"/>
+                <a:sym typeface="Roboto Mono"/>
+              </a:rPr>
+              <a:t>Green </a:t>
+            </a:r>
+            <a:r>
               <a:rPr lang="en" sz="1300">
                 <a:latin typeface="Roboto Mono"/>
                 <a:ea typeface="Roboto Mono"/>
                 <a:cs typeface="Roboto Mono"/>
                 <a:sym typeface="Roboto Mono"/>
               </a:rPr>
-              <a:t>Green - in word and right position</a:t>
+              <a:t>- in word and right position</a:t>
             </a:r>
             <a:endParaRPr sz="1300">
               <a:latin typeface="Roboto Mono"/>
@@ -12558,8 +12643,8 @@
         </p:blipFill>
         <p:spPr>
           <a:xfrm>
-            <a:off x="5540925" y="1039375"/>
-            <a:ext cx="3301225" cy="3301225"/>
+            <a:off x="5624825" y="1057325"/>
+            <a:ext cx="3244250" cy="3244250"/>
           </a:xfrm>
           <a:prstGeom prst="rect">
             <a:avLst/>
@@ -12578,7 +12663,7 @@
         </p:nvSpPr>
         <p:spPr>
           <a:xfrm>
-            <a:off x="108525" y="3628350"/>
+            <a:off x="184725" y="3628350"/>
             <a:ext cx="287400" cy="448800"/>
           </a:xfrm>
           <a:prstGeom prst="rect">
@@ -12951,6 +13036,196 @@
           </a:p>
         </p:txBody>
       </p:sp>
+      <p:sp>
+        <p:nvSpPr>
+          <p:cNvPr id="93" name="Google Shape;93;p18"/>
+          <p:cNvSpPr txBox="1"/>
+          <p:nvPr>
+            <p:ph idx="1" type="body"/>
+          </p:nvPr>
+        </p:nvSpPr>
+        <p:spPr>
+          <a:xfrm>
+            <a:off x="177050" y="2044275"/>
+            <a:ext cx="7821900" cy="1156500"/>
+          </a:xfrm>
+          <a:prstGeom prst="rect">
+            <a:avLst/>
+          </a:prstGeom>
+        </p:spPr>
+        <p:txBody>
+          <a:bodyPr anchorCtr="0" anchor="t" bIns="91425" lIns="91425" spcFirstLastPara="1" rIns="91425" wrap="square" tIns="91425">
+            <a:normAutofit/>
+          </a:bodyPr>
+          <a:lstStyle/>
+          <a:p>
+            <a:pPr indent="-336550" lvl="0" marL="457200" rtl="0" algn="l">
+              <a:lnSpc>
+                <a:spcPct val="100000"/>
+              </a:lnSpc>
+              <a:spcBef>
+                <a:spcPts val="0"/>
+              </a:spcBef>
+              <a:spcAft>
+                <a:spcPts val="0"/>
+              </a:spcAft>
+              <a:buSzPts val="1700"/>
+              <a:buFont typeface="Roboto Mono"/>
+              <a:buChar char="●"/>
+            </a:pPr>
+            <a:r>
+              <a:rPr b="1" lang="en" sz="1300" u="sng">
+                <a:latin typeface="Roboto Mono"/>
+                <a:ea typeface="Roboto Mono"/>
+                <a:cs typeface="Roboto Mono"/>
+                <a:sym typeface="Roboto Mono"/>
+              </a:rPr>
+              <a:t>Heuristic</a:t>
+            </a:r>
+            <a:r>
+              <a:rPr b="1" lang="en" sz="1300" u="sng">
+                <a:latin typeface="Roboto Mono"/>
+                <a:ea typeface="Roboto Mono"/>
+                <a:cs typeface="Roboto Mono"/>
+                <a:sym typeface="Roboto Mono"/>
+              </a:rPr>
+              <a:t> (Computer science):</a:t>
+            </a:r>
+            <a:endParaRPr b="1" sz="1300" u="sng">
+              <a:latin typeface="Roboto Mono"/>
+              <a:ea typeface="Roboto Mono"/>
+              <a:cs typeface="Roboto Mono"/>
+              <a:sym typeface="Roboto Mono"/>
+            </a:endParaRPr>
+          </a:p>
+          <a:p>
+            <a:pPr indent="-304800" lvl="1" marL="914400" rtl="0" algn="l">
+              <a:lnSpc>
+                <a:spcPct val="100000"/>
+              </a:lnSpc>
+              <a:spcBef>
+                <a:spcPts val="1000"/>
+              </a:spcBef>
+              <a:spcAft>
+                <a:spcPts val="0"/>
+              </a:spcAft>
+              <a:buSzPts val="1200"/>
+              <a:buFont typeface="Roboto Mono"/>
+              <a:buChar char="○"/>
+            </a:pPr>
+            <a:r>
+              <a:rPr lang="en" sz="1200">
+                <a:latin typeface="Roboto Mono"/>
+                <a:ea typeface="Roboto Mono"/>
+                <a:cs typeface="Roboto Mono"/>
+                <a:sym typeface="Roboto Mono"/>
+              </a:rPr>
+              <a:t>A heuristic is an approach to problem-solving that employs a practical method not guaranteed to be optimal or perfect, but sufficient for reaching an immediate, short-term goal or approximate solution.</a:t>
+            </a:r>
+            <a:endParaRPr sz="1200">
+              <a:latin typeface="Roboto Mono"/>
+              <a:ea typeface="Roboto Mono"/>
+              <a:cs typeface="Roboto Mono"/>
+              <a:sym typeface="Roboto Mono"/>
+            </a:endParaRPr>
+          </a:p>
+        </p:txBody>
+      </p:sp>
+      <p:sp>
+        <p:nvSpPr>
+          <p:cNvPr id="94" name="Google Shape;94;p18"/>
+          <p:cNvSpPr txBox="1"/>
+          <p:nvPr>
+            <p:ph idx="1" type="body"/>
+          </p:nvPr>
+        </p:nvSpPr>
+        <p:spPr>
+          <a:xfrm>
+            <a:off x="239900" y="3349750"/>
+            <a:ext cx="7821900" cy="1333500"/>
+          </a:xfrm>
+          <a:prstGeom prst="rect">
+            <a:avLst/>
+          </a:prstGeom>
+        </p:spPr>
+        <p:txBody>
+          <a:bodyPr anchorCtr="0" anchor="t" bIns="91425" lIns="91425" spcFirstLastPara="1" rIns="91425" wrap="square" tIns="91425">
+            <a:normAutofit lnSpcReduction="10000"/>
+          </a:bodyPr>
+          <a:lstStyle/>
+          <a:p>
+            <a:pPr indent="-336550" lvl="0" marL="457200" rtl="0" algn="l">
+              <a:lnSpc>
+                <a:spcPct val="100000"/>
+              </a:lnSpc>
+              <a:spcBef>
+                <a:spcPts val="0"/>
+              </a:spcBef>
+              <a:spcAft>
+                <a:spcPts val="0"/>
+              </a:spcAft>
+              <a:buSzPts val="1700"/>
+              <a:buFont typeface="Roboto Mono"/>
+              <a:buChar char="●"/>
+            </a:pPr>
+            <a:r>
+              <a:rPr b="1" lang="en" sz="1300" u="sng">
+                <a:latin typeface="Roboto Mono"/>
+                <a:ea typeface="Roboto Mono"/>
+                <a:cs typeface="Roboto Mono"/>
+                <a:sym typeface="Roboto Mono"/>
+              </a:rPr>
+              <a:t>Large Language Model </a:t>
+            </a:r>
+            <a:r>
+              <a:rPr b="1" lang="en" sz="1300" u="sng">
+                <a:latin typeface="Roboto Mono"/>
+                <a:ea typeface="Roboto Mono"/>
+                <a:cs typeface="Roboto Mono"/>
+                <a:sym typeface="Roboto Mono"/>
+              </a:rPr>
+              <a:t>(LLM):</a:t>
+            </a:r>
+            <a:endParaRPr b="1" sz="1300" u="sng">
+              <a:latin typeface="Roboto Mono"/>
+              <a:ea typeface="Roboto Mono"/>
+              <a:cs typeface="Roboto Mono"/>
+              <a:sym typeface="Roboto Mono"/>
+            </a:endParaRPr>
+          </a:p>
+          <a:p>
+            <a:pPr indent="-304800" lvl="1" marL="914400" rtl="0" algn="l">
+              <a:lnSpc>
+                <a:spcPct val="115000"/>
+              </a:lnSpc>
+              <a:spcBef>
+                <a:spcPts val="1000"/>
+              </a:spcBef>
+              <a:spcAft>
+                <a:spcPts val="0"/>
+              </a:spcAft>
+              <a:buSzPts val="1200"/>
+              <a:buFont typeface="Roboto Mono"/>
+              <a:buChar char="○"/>
+            </a:pPr>
+            <a:r>
+              <a:rPr lang="en" sz="1200">
+                <a:latin typeface="Roboto Mono"/>
+                <a:ea typeface="Roboto Mono"/>
+                <a:cs typeface="Roboto Mono"/>
+                <a:sym typeface="Roboto Mono"/>
+              </a:rPr>
+              <a:t>A Large Language Model is a deep learning model, typically based on a transformer architecture, that uses billions (or even trillions) of parameters to perform natural language processing tasks such as text generation, translation, summarization, and question answering.</a:t>
+            </a:r>
+            <a:endParaRPr sz="1200">
+              <a:latin typeface="Roboto Mono"/>
+              <a:ea typeface="Roboto Mono"/>
+              <a:cs typeface="Roboto Mono"/>
+              <a:sym typeface="Roboto Mono"/>
+            </a:endParaRPr>
+          </a:p>
+        </p:txBody>
+      </p:sp>
     </p:spTree>
   </p:cSld>
   <p:clrMapOvr>
@@ -12964,7 +13239,7 @@
   <p:cSld>
     <p:spTree>
       <p:nvGrpSpPr>
-        <p:cNvPr id="96" name="Shape 96"/>
+        <p:cNvPr id="98" name="Shape 98"/>
         <p:cNvGrpSpPr/>
         <p:nvPr/>
       </p:nvGrpSpPr>
@@ -12978,7 +13253,7 @@
       </p:grpSpPr>
       <p:sp>
         <p:nvSpPr>
-          <p:cNvPr id="97" name="Google Shape;97;p19"/>
+          <p:cNvPr id="99" name="Google Shape;99;p19"/>
           <p:cNvSpPr txBox="1"/>
           <p:nvPr>
             <p:ph type="title"/>
@@ -13035,7 +13310,7 @@
       </p:sp>
       <p:sp>
         <p:nvSpPr>
-          <p:cNvPr id="98" name="Google Shape;98;p19"/>
+          <p:cNvPr id="100" name="Google Shape;100;p19"/>
           <p:cNvSpPr txBox="1"/>
           <p:nvPr>
             <p:ph idx="12" type="sldNum"/>
@@ -13086,7 +13361,7 @@
   <p:cSld>
     <p:spTree>
       <p:nvGrpSpPr>
-        <p:cNvPr id="102" name="Shape 102"/>
+        <p:cNvPr id="104" name="Shape 104"/>
         <p:cNvGrpSpPr/>
         <p:nvPr/>
       </p:nvGrpSpPr>
@@ -13100,7 +13375,7 @@
       </p:grpSpPr>
       <p:sp>
         <p:nvSpPr>
-          <p:cNvPr id="103" name="Google Shape;103;p20"/>
+          <p:cNvPr id="105" name="Google Shape;105;p20"/>
           <p:cNvSpPr txBox="1"/>
           <p:nvPr>
             <p:ph type="title"/>
@@ -13149,7 +13424,7 @@
       </p:sp>
       <p:sp>
         <p:nvSpPr>
-          <p:cNvPr id="104" name="Google Shape;104;p20"/>
+          <p:cNvPr id="106" name="Google Shape;106;p20"/>
           <p:cNvSpPr txBox="1"/>
           <p:nvPr>
             <p:ph idx="12" type="sldNum"/>
@@ -13189,7 +13464,7 @@
       </p:sp>
       <p:sp>
         <p:nvSpPr>
-          <p:cNvPr id="105" name="Google Shape;105;p20"/>
+          <p:cNvPr id="107" name="Google Shape;107;p20"/>
           <p:cNvSpPr txBox="1"/>
           <p:nvPr>
             <p:ph idx="1" type="body"/>
@@ -13251,7 +13526,7 @@
       </p:sp>
       <p:sp>
         <p:nvSpPr>
-          <p:cNvPr id="106" name="Google Shape;106;p20"/>
+          <p:cNvPr id="108" name="Google Shape;108;p20"/>
           <p:cNvSpPr/>
           <p:nvPr/>
         </p:nvSpPr>
@@ -13298,7 +13573,7 @@
       </p:sp>
       <p:grpSp>
         <p:nvGrpSpPr>
-          <p:cNvPr id="107" name="Google Shape;107;p20"/>
+          <p:cNvPr id="109" name="Google Shape;109;p20"/>
           <p:cNvGrpSpPr/>
           <p:nvPr/>
         </p:nvGrpSpPr>
@@ -13312,7 +13587,7 @@
         </p:grpSpPr>
         <p:cxnSp>
           <p:nvCxnSpPr>
-            <p:cNvPr id="108" name="Google Shape;108;p20"/>
+            <p:cNvPr id="110" name="Google Shape;110;p20"/>
             <p:cNvCxnSpPr/>
             <p:nvPr/>
           </p:nvCxnSpPr>
@@ -13338,7 +13613,7 @@
         </p:cxnSp>
         <p:sp>
           <p:nvSpPr>
-            <p:cNvPr id="109" name="Google Shape;109;p20"/>
+            <p:cNvPr id="111" name="Google Shape;111;p20"/>
             <p:cNvSpPr txBox="1"/>
             <p:nvPr/>
           </p:nvSpPr>
@@ -13394,7 +13669,7 @@
       </p:grpSp>
       <p:grpSp>
         <p:nvGrpSpPr>
-          <p:cNvPr id="110" name="Google Shape;110;p20"/>
+          <p:cNvPr id="112" name="Google Shape;112;p20"/>
           <p:cNvGrpSpPr/>
           <p:nvPr/>
         </p:nvGrpSpPr>
@@ -13408,7 +13683,7 @@
         </p:grpSpPr>
         <p:cxnSp>
           <p:nvCxnSpPr>
-            <p:cNvPr id="111" name="Google Shape;111;p20"/>
+            <p:cNvPr id="113" name="Google Shape;113;p20"/>
             <p:cNvCxnSpPr/>
             <p:nvPr/>
           </p:nvCxnSpPr>
@@ -13434,7 +13709,7 @@
         </p:cxnSp>
         <p:sp>
           <p:nvSpPr>
-            <p:cNvPr id="112" name="Google Shape;112;p20"/>
+            <p:cNvPr id="114" name="Google Shape;114;p20"/>
             <p:cNvSpPr txBox="1"/>
             <p:nvPr/>
           </p:nvSpPr>
@@ -13490,7 +13765,7 @@
       </p:grpSp>
       <p:sp>
         <p:nvSpPr>
-          <p:cNvPr id="113" name="Google Shape;113;p20"/>
+          <p:cNvPr id="115" name="Google Shape;115;p20"/>
           <p:cNvSpPr/>
           <p:nvPr/>
         </p:nvSpPr>
@@ -13544,7 +13819,7 @@
       </p:sp>
       <p:grpSp>
         <p:nvGrpSpPr>
-          <p:cNvPr id="114" name="Google Shape;114;p20"/>
+          <p:cNvPr id="116" name="Google Shape;116;p20"/>
           <p:cNvGrpSpPr/>
           <p:nvPr/>
         </p:nvGrpSpPr>
@@ -13558,7 +13833,7 @@
         </p:grpSpPr>
         <p:cxnSp>
           <p:nvCxnSpPr>
-            <p:cNvPr id="115" name="Google Shape;115;p20"/>
+            <p:cNvPr id="117" name="Google Shape;117;p20"/>
             <p:cNvCxnSpPr/>
             <p:nvPr/>
           </p:nvCxnSpPr>
@@ -13584,7 +13859,7 @@
         </p:cxnSp>
         <p:sp>
           <p:nvSpPr>
-            <p:cNvPr id="116" name="Google Shape;116;p20"/>
+            <p:cNvPr id="118" name="Google Shape;118;p20"/>
             <p:cNvSpPr txBox="1"/>
             <p:nvPr/>
           </p:nvSpPr>
@@ -13640,7 +13915,7 @@
       </p:grpSp>
       <p:grpSp>
         <p:nvGrpSpPr>
-          <p:cNvPr id="117" name="Google Shape;117;p20"/>
+          <p:cNvPr id="119" name="Google Shape;119;p20"/>
           <p:cNvGrpSpPr/>
           <p:nvPr/>
         </p:nvGrpSpPr>
@@ -13654,7 +13929,7 @@
         </p:grpSpPr>
         <p:cxnSp>
           <p:nvCxnSpPr>
-            <p:cNvPr id="118" name="Google Shape;118;p20"/>
+            <p:cNvPr id="120" name="Google Shape;120;p20"/>
             <p:cNvCxnSpPr/>
             <p:nvPr/>
           </p:nvCxnSpPr>
@@ -13680,7 +13955,7 @@
         </p:cxnSp>
         <p:sp>
           <p:nvSpPr>
-            <p:cNvPr id="119" name="Google Shape;119;p20"/>
+            <p:cNvPr id="121" name="Google Shape;121;p20"/>
             <p:cNvSpPr txBox="1"/>
             <p:nvPr/>
           </p:nvSpPr>
@@ -13736,7 +14011,7 @@
       </p:grpSp>
       <p:sp>
         <p:nvSpPr>
-          <p:cNvPr id="120" name="Google Shape;120;p20"/>
+          <p:cNvPr id="122" name="Google Shape;122;p20"/>
           <p:cNvSpPr txBox="1"/>
           <p:nvPr/>
         </p:nvSpPr>
@@ -13786,7 +14061,7 @@
       </p:sp>
       <p:sp>
         <p:nvSpPr>
-          <p:cNvPr id="121" name="Google Shape;121;p20"/>
+          <p:cNvPr id="123" name="Google Shape;123;p20"/>
           <p:cNvSpPr/>
           <p:nvPr/>
         </p:nvSpPr>
@@ -13840,7 +14115,7 @@
       </p:sp>
       <p:sp>
         <p:nvSpPr>
-          <p:cNvPr id="122" name="Google Shape;122;p20"/>
+          <p:cNvPr id="124" name="Google Shape;124;p20"/>
           <p:cNvSpPr/>
           <p:nvPr/>
         </p:nvSpPr>
@@ -13894,7 +14169,7 @@
       </p:sp>
       <p:sp>
         <p:nvSpPr>
-          <p:cNvPr id="123" name="Google Shape;123;p20"/>
+          <p:cNvPr id="125" name="Google Shape;125;p20"/>
           <p:cNvSpPr/>
           <p:nvPr/>
         </p:nvSpPr>
@@ -13948,7 +14223,7 @@
       </p:sp>
       <p:sp>
         <p:nvSpPr>
-          <p:cNvPr id="124" name="Google Shape;124;p20"/>
+          <p:cNvPr id="126" name="Google Shape;126;p20"/>
           <p:cNvSpPr/>
           <p:nvPr/>
         </p:nvSpPr>
@@ -13962,92 +14237,6 @@
           </a:prstGeom>
           <a:solidFill>
             <a:srgbClr val="085630"/>
-          </a:solidFill>
-          <a:ln>
-            <a:noFill/>
-          </a:ln>
-        </p:spPr>
-        <p:txBody>
-          <a:bodyPr anchorCtr="0" anchor="ctr" bIns="91425" lIns="91425" spcFirstLastPara="1" rIns="91425" wrap="square" tIns="91425">
-            <a:noAutofit/>
-          </a:bodyPr>
-          <a:lstStyle/>
-          <a:p>
-            <a:pPr indent="0" lvl="0" marL="0" rtl="0" algn="l">
-              <a:spcBef>
-                <a:spcPts val="0"/>
-              </a:spcBef>
-              <a:spcAft>
-                <a:spcPts val="0"/>
-              </a:spcAft>
-              <a:buNone/>
-            </a:pPr>
-            <a:r>
-              <a:t/>
-            </a:r>
-            <a:endParaRPr/>
-          </a:p>
-        </p:txBody>
-      </p:sp>
-      <p:sp>
-        <p:nvSpPr>
-          <p:cNvPr id="125" name="Google Shape;125;p20"/>
-          <p:cNvSpPr/>
-          <p:nvPr/>
-        </p:nvSpPr>
-        <p:spPr>
-          <a:xfrm rot="-2700000">
-            <a:off x="5598628" y="2555088"/>
-            <a:ext cx="363170" cy="363170"/>
-          </a:xfrm>
-          <a:prstGeom prst="rtTriangle">
-            <a:avLst/>
-          </a:prstGeom>
-          <a:solidFill>
-            <a:srgbClr val="085630"/>
-          </a:solidFill>
-          <a:ln>
-            <a:noFill/>
-          </a:ln>
-        </p:spPr>
-        <p:txBody>
-          <a:bodyPr anchorCtr="0" anchor="ctr" bIns="91425" lIns="91425" spcFirstLastPara="1" rIns="91425" wrap="square" tIns="91425">
-            <a:noAutofit/>
-          </a:bodyPr>
-          <a:lstStyle/>
-          <a:p>
-            <a:pPr indent="0" lvl="0" marL="0" rtl="0" algn="l">
-              <a:spcBef>
-                <a:spcPts val="0"/>
-              </a:spcBef>
-              <a:spcAft>
-                <a:spcPts val="0"/>
-              </a:spcAft>
-              <a:buNone/>
-            </a:pPr>
-            <a:r>
-              <a:t/>
-            </a:r>
-            <a:endParaRPr/>
-          </a:p>
-        </p:txBody>
-      </p:sp>
-      <p:sp>
-        <p:nvSpPr>
-          <p:cNvPr id="126" name="Google Shape;126;p20"/>
-          <p:cNvSpPr/>
-          <p:nvPr/>
-        </p:nvSpPr>
-        <p:spPr>
-          <a:xfrm rot="2700000">
-            <a:off x="4382023" y="3767861"/>
-            <a:ext cx="363170" cy="363170"/>
-          </a:xfrm>
-          <a:prstGeom prst="rtTriangle">
-            <a:avLst/>
-          </a:prstGeom>
-          <a:solidFill>
-            <a:srgbClr val="0E9453"/>
           </a:solidFill>
           <a:ln>
             <a:noFill/>
@@ -14082,15 +14271,15 @@
           <p:nvPr/>
         </p:nvSpPr>
         <p:spPr>
-          <a:xfrm rot="-8100000">
-            <a:off x="4382715" y="1332193"/>
+          <a:xfrm rot="-2700000">
+            <a:off x="5598628" y="2555088"/>
             <a:ext cx="363170" cy="363170"/>
           </a:xfrm>
           <a:prstGeom prst="rtTriangle">
             <a:avLst/>
           </a:prstGeom>
           <a:solidFill>
-            <a:srgbClr val="0E9453"/>
+            <a:srgbClr val="085630"/>
           </a:solidFill>
           <a:ln>
             <a:noFill/>
@@ -14121,6 +14310,92 @@
       <p:sp>
         <p:nvSpPr>
           <p:cNvPr id="128" name="Google Shape;128;p20"/>
+          <p:cNvSpPr/>
+          <p:nvPr/>
+        </p:nvSpPr>
+        <p:spPr>
+          <a:xfrm rot="2700000">
+            <a:off x="4382023" y="3767861"/>
+            <a:ext cx="363170" cy="363170"/>
+          </a:xfrm>
+          <a:prstGeom prst="rtTriangle">
+            <a:avLst/>
+          </a:prstGeom>
+          <a:solidFill>
+            <a:srgbClr val="0E9453"/>
+          </a:solidFill>
+          <a:ln>
+            <a:noFill/>
+          </a:ln>
+        </p:spPr>
+        <p:txBody>
+          <a:bodyPr anchorCtr="0" anchor="ctr" bIns="91425" lIns="91425" spcFirstLastPara="1" rIns="91425" wrap="square" tIns="91425">
+            <a:noAutofit/>
+          </a:bodyPr>
+          <a:lstStyle/>
+          <a:p>
+            <a:pPr indent="0" lvl="0" marL="0" rtl="0" algn="l">
+              <a:spcBef>
+                <a:spcPts val="0"/>
+              </a:spcBef>
+              <a:spcAft>
+                <a:spcPts val="0"/>
+              </a:spcAft>
+              <a:buNone/>
+            </a:pPr>
+            <a:r>
+              <a:t/>
+            </a:r>
+            <a:endParaRPr/>
+          </a:p>
+        </p:txBody>
+      </p:sp>
+      <p:sp>
+        <p:nvSpPr>
+          <p:cNvPr id="129" name="Google Shape;129;p20"/>
+          <p:cNvSpPr/>
+          <p:nvPr/>
+        </p:nvSpPr>
+        <p:spPr>
+          <a:xfrm rot="-8100000">
+            <a:off x="4382715" y="1332193"/>
+            <a:ext cx="363170" cy="363170"/>
+          </a:xfrm>
+          <a:prstGeom prst="rtTriangle">
+            <a:avLst/>
+          </a:prstGeom>
+          <a:solidFill>
+            <a:srgbClr val="0E9453"/>
+          </a:solidFill>
+          <a:ln>
+            <a:noFill/>
+          </a:ln>
+        </p:spPr>
+        <p:txBody>
+          <a:bodyPr anchorCtr="0" anchor="ctr" bIns="91425" lIns="91425" spcFirstLastPara="1" rIns="91425" wrap="square" tIns="91425">
+            <a:noAutofit/>
+          </a:bodyPr>
+          <a:lstStyle/>
+          <a:p>
+            <a:pPr indent="0" lvl="0" marL="0" rtl="0" algn="l">
+              <a:spcBef>
+                <a:spcPts val="0"/>
+              </a:spcBef>
+              <a:spcAft>
+                <a:spcPts val="0"/>
+              </a:spcAft>
+              <a:buNone/>
+            </a:pPr>
+            <a:r>
+              <a:t/>
+            </a:r>
+            <a:endParaRPr/>
+          </a:p>
+        </p:txBody>
+      </p:sp>
+      <p:sp>
+        <p:nvSpPr>
+          <p:cNvPr id="130" name="Google Shape;130;p20"/>
           <p:cNvSpPr/>
           <p:nvPr/>
         </p:nvSpPr>
@@ -14172,7 +14447,7 @@
       </p:sp>
       <p:sp>
         <p:nvSpPr>
-          <p:cNvPr id="129" name="Google Shape;129;p20"/>
+          <p:cNvPr id="131" name="Google Shape;131;p20"/>
           <p:cNvSpPr txBox="1"/>
           <p:nvPr>
             <p:ph idx="1" type="body"/>
@@ -14234,7 +14509,7 @@
       </p:sp>
       <p:sp>
         <p:nvSpPr>
-          <p:cNvPr id="130" name="Google Shape;130;p20"/>
+          <p:cNvPr id="132" name="Google Shape;132;p20"/>
           <p:cNvSpPr/>
           <p:nvPr/>
         </p:nvSpPr>
@@ -14297,7 +14572,7 @@
   <p:cSld>
     <p:spTree>
       <p:nvGrpSpPr>
-        <p:cNvPr id="134" name="Shape 134"/>
+        <p:cNvPr id="136" name="Shape 136"/>
         <p:cNvGrpSpPr/>
         <p:nvPr/>
       </p:nvGrpSpPr>
@@ -14311,7 +14586,7 @@
       </p:grpSpPr>
       <p:sp>
         <p:nvSpPr>
-          <p:cNvPr id="135" name="Google Shape;135;p21"/>
+          <p:cNvPr id="137" name="Google Shape;137;p21"/>
           <p:cNvSpPr/>
           <p:nvPr/>
         </p:nvSpPr>
@@ -14362,7 +14637,7 @@
       </p:sp>
       <p:sp>
         <p:nvSpPr>
-          <p:cNvPr id="136" name="Google Shape;136;p21"/>
+          <p:cNvPr id="138" name="Google Shape;138;p21"/>
           <p:cNvSpPr txBox="1"/>
           <p:nvPr>
             <p:ph type="title"/>
@@ -14411,7 +14686,7 @@
       </p:sp>
       <p:sp>
         <p:nvSpPr>
-          <p:cNvPr id="137" name="Google Shape;137;p21"/>
+          <p:cNvPr id="139" name="Google Shape;139;p21"/>
           <p:cNvSpPr txBox="1"/>
           <p:nvPr>
             <p:ph idx="12" type="sldNum"/>
@@ -14451,7 +14726,7 @@
       </p:sp>
       <p:pic>
         <p:nvPicPr>
-          <p:cNvPr id="138" name="Google Shape;138;p21"/>
+          <p:cNvPr id="140" name="Google Shape;140;p21"/>
           <p:cNvPicPr preferRelativeResize="0"/>
           <p:nvPr/>
         </p:nvPicPr>
@@ -14479,7 +14754,7 @@
       </p:pic>
       <p:sp>
         <p:nvSpPr>
-          <p:cNvPr id="139" name="Google Shape;139;p21"/>
+          <p:cNvPr id="141" name="Google Shape;141;p21"/>
           <p:cNvSpPr txBox="1"/>
           <p:nvPr/>
         </p:nvSpPr>
@@ -14720,7 +14995,7 @@
       </p:sp>
       <p:pic>
         <p:nvPicPr>
-          <p:cNvPr id="140" name="Google Shape;140;p21"/>
+          <p:cNvPr id="142" name="Google Shape;142;p21"/>
           <p:cNvPicPr preferRelativeResize="0"/>
           <p:nvPr/>
         </p:nvPicPr>
@@ -14748,7 +15023,7 @@
       </p:pic>
       <p:sp>
         <p:nvSpPr>
-          <p:cNvPr id="141" name="Google Shape;141;p21"/>
+          <p:cNvPr id="143" name="Google Shape;143;p21"/>
           <p:cNvSpPr txBox="1"/>
           <p:nvPr/>
         </p:nvSpPr>
@@ -14906,7 +15181,7 @@
                 <a:cs typeface="Roboto Mono"/>
                 <a:sym typeface="Roboto Mono"/>
               </a:rPr>
-              <a:t>(~15000 5 letter words)</a:t>
+              <a:t>(~16000 5 letter words)</a:t>
             </a:r>
             <a:endParaRPr sz="1200">
               <a:solidFill>
@@ -14922,7 +15197,7 @@
       </p:sp>
       <p:sp>
         <p:nvSpPr>
-          <p:cNvPr id="142" name="Google Shape;142;p21"/>
+          <p:cNvPr id="144" name="Google Shape;144;p21"/>
           <p:cNvSpPr txBox="1"/>
           <p:nvPr/>
         </p:nvSpPr>
@@ -15157,7 +15432,7 @@
       </p:sp>
       <p:sp>
         <p:nvSpPr>
-          <p:cNvPr id="143" name="Google Shape;143;p21"/>
+          <p:cNvPr id="145" name="Google Shape;145;p21"/>
           <p:cNvSpPr txBox="1"/>
           <p:nvPr/>
         </p:nvSpPr>

</xml_diff>